<commit_message>
add description of fetched data display into pagination overview #3218
(cherry picked from commit 1c0a0018abfe3ea76b5cbb48de88f59b26126d17)
</commit_message>
<xml_diff>
--- a/source/ArchitectureInDetail/WebApplicationDetail/images_Pagination/materialPagination.pptx
+++ b/source/ArchitectureInDetail/WebApplicationDetail/images_Pagination/materialPagination.pptx
@@ -8,7 +8,7 @@
     <p:notesMasterId r:id="rId19"/>
   </p:notesMasterIdLst>
   <p:sldIdLst>
-    <p:sldId id="283" r:id="rId2"/>
+    <p:sldId id="303" r:id="rId2"/>
     <p:sldId id="284" r:id="rId3"/>
     <p:sldId id="285" r:id="rId4"/>
     <p:sldId id="286" r:id="rId5"/>
@@ -128,7 +128,7 @@
       <p14:sectionLst xmlns:p14="http://schemas.microsoft.com/office/powerpoint/2010/main">
         <p14:section name="既定のセクション" id="{B0D6C479-3D78-4E00-970A-88F7D4B46CCD}">
           <p14:sldIdLst>
-            <p14:sldId id="283"/>
+            <p14:sldId id="303"/>
             <p14:sldId id="284"/>
             <p14:sldId id="285"/>
             <p14:sldId id="286"/>
@@ -148,6 +148,20 @@
           </p14:sldIdLst>
         </p14:section>
       </p14:sectionLst>
+    </p:ext>
+    <p:ext uri="{EFAFB233-063F-42B5-8137-9DF3F51BA10A}">
+      <p15:sldGuideLst xmlns:p15="http://schemas.microsoft.com/office/powerpoint/2012/main">
+        <p15:guide id="1" orient="horz" pos="2160">
+          <p15:clr>
+            <a:srgbClr val="A4A3A4"/>
+          </p15:clr>
+        </p15:guide>
+        <p15:guide id="2" pos="2880">
+          <p15:clr>
+            <a:srgbClr val="A4A3A4"/>
+          </p15:clr>
+        </p15:guide>
+      </p15:sldGuideLst>
     </p:ext>
   </p:extLst>
 </p:presentation>
@@ -236,7 +250,7 @@
             <a:fld id="{3BB47352-BF5A-4CD2-B029-996118CD8E01}" type="datetimeFigureOut">
               <a:rPr kumimoji="1" lang="ja-JP" altLang="en-US" smtClean="0"/>
               <a:pPr/>
-              <a:t>2015/1/8</a:t>
+              <a:t>2018/2/28</a:t>
             </a:fld>
             <a:endParaRPr kumimoji="1" lang="ja-JP" altLang="en-US"/>
           </a:p>
@@ -719,7 +733,7 @@
             <a:fld id="{7B9B12EC-6AA0-374B-A2D3-850081A07A26}" type="datetimeFigureOut">
               <a:rPr kumimoji="1" lang="ja-JP" altLang="en-US" smtClean="0"/>
               <a:pPr/>
-              <a:t>2015/1/8</a:t>
+              <a:t>2018/2/28</a:t>
             </a:fld>
             <a:endParaRPr kumimoji="1" lang="ja-JP" altLang="en-US"/>
           </a:p>
@@ -923,7 +937,7 @@
             <a:fld id="{7B9B12EC-6AA0-374B-A2D3-850081A07A26}" type="datetimeFigureOut">
               <a:rPr kumimoji="1" lang="ja-JP" altLang="en-US" smtClean="0"/>
               <a:pPr/>
-              <a:t>2015/1/8</a:t>
+              <a:t>2018/2/28</a:t>
             </a:fld>
             <a:endParaRPr kumimoji="1" lang="ja-JP" altLang="en-US"/>
           </a:p>
@@ -1137,7 +1151,7 @@
             <a:fld id="{7B9B12EC-6AA0-374B-A2D3-850081A07A26}" type="datetimeFigureOut">
               <a:rPr kumimoji="1" lang="ja-JP" altLang="en-US" smtClean="0"/>
               <a:pPr/>
-              <a:t>2015/1/8</a:t>
+              <a:t>2018/2/28</a:t>
             </a:fld>
             <a:endParaRPr kumimoji="1" lang="ja-JP" altLang="en-US"/>
           </a:p>
@@ -1341,7 +1355,7 @@
             <a:fld id="{7B9B12EC-6AA0-374B-A2D3-850081A07A26}" type="datetimeFigureOut">
               <a:rPr kumimoji="1" lang="ja-JP" altLang="en-US" smtClean="0"/>
               <a:pPr/>
-              <a:t>2015/1/8</a:t>
+              <a:t>2018/2/28</a:t>
             </a:fld>
             <a:endParaRPr kumimoji="1" lang="ja-JP" altLang="en-US"/>
           </a:p>
@@ -1589,7 +1603,7 @@
             <a:fld id="{7B9B12EC-6AA0-374B-A2D3-850081A07A26}" type="datetimeFigureOut">
               <a:rPr kumimoji="1" lang="ja-JP" altLang="en-US" smtClean="0"/>
               <a:pPr/>
-              <a:t>2015/1/8</a:t>
+              <a:t>2018/2/28</a:t>
             </a:fld>
             <a:endParaRPr kumimoji="1" lang="ja-JP" altLang="en-US"/>
           </a:p>
@@ -1943,7 +1957,7 @@
             <a:fld id="{7B9B12EC-6AA0-374B-A2D3-850081A07A26}" type="datetimeFigureOut">
               <a:rPr kumimoji="1" lang="ja-JP" altLang="en-US" smtClean="0"/>
               <a:pPr/>
-              <a:t>2015/1/8</a:t>
+              <a:t>2018/2/28</a:t>
             </a:fld>
             <a:endParaRPr kumimoji="1" lang="ja-JP" altLang="en-US"/>
           </a:p>
@@ -2431,7 +2445,7 @@
             <a:fld id="{7B9B12EC-6AA0-374B-A2D3-850081A07A26}" type="datetimeFigureOut">
               <a:rPr kumimoji="1" lang="ja-JP" altLang="en-US" smtClean="0"/>
               <a:pPr/>
-              <a:t>2015/1/8</a:t>
+              <a:t>2018/2/28</a:t>
             </a:fld>
             <a:endParaRPr kumimoji="1" lang="ja-JP" altLang="en-US"/>
           </a:p>
@@ -2551,7 +2565,7 @@
             <a:fld id="{7B9B12EC-6AA0-374B-A2D3-850081A07A26}" type="datetimeFigureOut">
               <a:rPr kumimoji="1" lang="ja-JP" altLang="en-US" smtClean="0"/>
               <a:pPr/>
-              <a:t>2015/1/8</a:t>
+              <a:t>2018/2/28</a:t>
             </a:fld>
             <a:endParaRPr kumimoji="1" lang="ja-JP" altLang="en-US"/>
           </a:p>
@@ -2648,7 +2662,7 @@
             <a:fld id="{7B9B12EC-6AA0-374B-A2D3-850081A07A26}" type="datetimeFigureOut">
               <a:rPr kumimoji="1" lang="ja-JP" altLang="en-US" smtClean="0"/>
               <a:pPr/>
-              <a:t>2015/1/8</a:t>
+              <a:t>2018/2/28</a:t>
             </a:fld>
             <a:endParaRPr kumimoji="1" lang="ja-JP" altLang="en-US"/>
           </a:p>
@@ -2959,7 +2973,7 @@
             <a:fld id="{7B9B12EC-6AA0-374B-A2D3-850081A07A26}" type="datetimeFigureOut">
               <a:rPr kumimoji="1" lang="ja-JP" altLang="en-US" smtClean="0"/>
               <a:pPr/>
-              <a:t>2015/1/8</a:t>
+              <a:t>2018/2/28</a:t>
             </a:fld>
             <a:endParaRPr kumimoji="1" lang="ja-JP" altLang="en-US"/>
           </a:p>
@@ -3214,7 +3228,7 @@
             <a:fld id="{7B9B12EC-6AA0-374B-A2D3-850081A07A26}" type="datetimeFigureOut">
               <a:rPr kumimoji="1" lang="ja-JP" altLang="en-US" smtClean="0"/>
               <a:pPr/>
-              <a:t>2015/1/8</a:t>
+              <a:t>2018/2/28</a:t>
             </a:fld>
             <a:endParaRPr kumimoji="1" lang="ja-JP" altLang="en-US"/>
           </a:p>
@@ -3461,7 +3475,7 @@
             <a:fld id="{7B9B12EC-6AA0-374B-A2D3-850081A07A26}" type="datetimeFigureOut">
               <a:rPr kumimoji="1" lang="ja-JP" altLang="en-US" smtClean="0"/>
               <a:pPr/>
-              <a:t>2015/1/8</a:t>
+              <a:t>2018/2/28</a:t>
             </a:fld>
             <a:endParaRPr kumimoji="1" lang="ja-JP" altLang="en-US"/>
           </a:p>
@@ -3981,6 +3995,129 @@
       </p:sp>
       <p:sp>
         <p:nvSpPr>
+          <p:cNvPr id="10" name="線吹き出し 2 (枠付き) 9"/>
+          <p:cNvSpPr/>
+          <p:nvPr/>
+        </p:nvSpPr>
+        <p:spPr>
+          <a:xfrm>
+            <a:off x="5747655" y="5794829"/>
+            <a:ext cx="1509487" cy="885372"/>
+          </a:xfrm>
+          <a:prstGeom prst="borderCallout2">
+            <a:avLst>
+              <a:gd name="adj1" fmla="val 50717"/>
+              <a:gd name="adj2" fmla="val -5448"/>
+              <a:gd name="adj3" fmla="val 50717"/>
+              <a:gd name="adj4" fmla="val -24141"/>
+              <a:gd name="adj5" fmla="val 14046"/>
+              <a:gd name="adj6" fmla="val -41991"/>
+            </a:avLst>
+          </a:prstGeom>
+          <a:solidFill>
+            <a:schemeClr val="bg1"/>
+          </a:solidFill>
+        </p:spPr>
+        <p:style>
+          <a:lnRef idx="1">
+            <a:schemeClr val="accent1"/>
+          </a:lnRef>
+          <a:fillRef idx="3">
+            <a:schemeClr val="accent1"/>
+          </a:fillRef>
+          <a:effectRef idx="2">
+            <a:schemeClr val="accent1"/>
+          </a:effectRef>
+          <a:fontRef idx="minor">
+            <a:schemeClr val="lt1"/>
+          </a:fontRef>
+        </p:style>
+        <p:txBody>
+          <a:bodyPr rtlCol="0" anchor="ctr"/>
+          <a:lstStyle/>
+          <a:p>
+            <a:pPr algn="ctr"/>
+            <a:r>
+              <a:rPr lang="en-US" altLang="ja-JP" dirty="0" smtClean="0">
+                <a:solidFill>
+                  <a:schemeClr val="tx1"/>
+                </a:solidFill>
+              </a:rPr>
+              <a:t>(3)</a:t>
+            </a:r>
+          </a:p>
+          <a:p>
+            <a:pPr algn="ctr"/>
+            <a:r>
+              <a:rPr lang="en-US" altLang="ja-JP" dirty="0" smtClean="0">
+                <a:solidFill>
+                  <a:schemeClr val="tx1"/>
+                </a:solidFill>
+              </a:rPr>
+              <a:t>Pagination  </a:t>
+            </a:r>
+            <a:r>
+              <a:rPr lang="en-US" altLang="ja-JP" dirty="0">
+                <a:solidFill>
+                  <a:schemeClr val="tx1"/>
+                </a:solidFill>
+              </a:rPr>
+              <a:t>Information</a:t>
+            </a:r>
+            <a:endParaRPr kumimoji="1" lang="ja-JP" altLang="en-US" dirty="0">
+              <a:solidFill>
+                <a:schemeClr val="tx1"/>
+              </a:solidFill>
+            </a:endParaRPr>
+          </a:p>
+        </p:txBody>
+      </p:sp>
+      <p:sp>
+        <p:nvSpPr>
+          <p:cNvPr id="7" name="角丸四角形 6"/>
+          <p:cNvSpPr/>
+          <p:nvPr/>
+        </p:nvSpPr>
+        <p:spPr>
+          <a:xfrm>
+            <a:off x="1463039" y="2236993"/>
+            <a:ext cx="6260951" cy="2634734"/>
+          </a:xfrm>
+          <a:prstGeom prst="roundRect">
+            <a:avLst/>
+          </a:prstGeom>
+          <a:noFill/>
+          <a:ln w="41275">
+            <a:solidFill>
+              <a:srgbClr val="FF0000"/>
+            </a:solidFill>
+          </a:ln>
+        </p:spPr>
+        <p:style>
+          <a:lnRef idx="1">
+            <a:schemeClr val="accent1"/>
+          </a:lnRef>
+          <a:fillRef idx="3">
+            <a:schemeClr val="accent1"/>
+          </a:fillRef>
+          <a:effectRef idx="2">
+            <a:schemeClr val="accent1"/>
+          </a:effectRef>
+          <a:fontRef idx="minor">
+            <a:schemeClr val="lt1"/>
+          </a:fontRef>
+        </p:style>
+        <p:txBody>
+          <a:bodyPr rtlCol="0" anchor="ctr"/>
+          <a:lstStyle/>
+          <a:p>
+            <a:pPr algn="ctr"/>
+            <a:endParaRPr kumimoji="1" lang="ja-JP" altLang="en-US"/>
+          </a:p>
+        </p:txBody>
+      </p:sp>
+      <p:sp>
+        <p:nvSpPr>
           <p:cNvPr id="6" name="線吹き出し 2 (枠付き) 5"/>
           <p:cNvSpPr/>
           <p:nvPr/>
@@ -4029,7 +4166,7 @@
                   <a:schemeClr val="tx1"/>
                 </a:solidFill>
               </a:rPr>
-              <a:t>(1)</a:t>
+              <a:t>(2)</a:t>
             </a:r>
           </a:p>
           <a:p>
@@ -4040,15 +4177,7 @@
                   <a:schemeClr val="tx1"/>
                 </a:solidFill>
               </a:rPr>
-              <a:t>Pagination </a:t>
-            </a:r>
-            <a:r>
-              <a:rPr lang="en-US" altLang="ja-JP" dirty="0">
-                <a:solidFill>
-                  <a:schemeClr val="tx1"/>
-                </a:solidFill>
-              </a:rPr>
-              <a:t>Links</a:t>
+              <a:t>Pagination Links</a:t>
             </a:r>
             <a:endParaRPr kumimoji="1" lang="ja-JP" altLang="en-US" dirty="0">
               <a:solidFill>
@@ -4060,23 +4189,23 @@
       </p:sp>
       <p:sp>
         <p:nvSpPr>
-          <p:cNvPr id="10" name="線吹き出し 2 (枠付き) 9"/>
+          <p:cNvPr id="9" name="線吹き出し 2 (枠付き) 8"/>
           <p:cNvSpPr/>
           <p:nvPr/>
         </p:nvSpPr>
         <p:spPr>
           <a:xfrm>
-            <a:off x="5747655" y="5794829"/>
-            <a:ext cx="1509487" cy="885372"/>
+            <a:off x="1270001" y="5181983"/>
+            <a:ext cx="1429655" cy="907144"/>
           </a:xfrm>
           <a:prstGeom prst="borderCallout2">
             <a:avLst>
-              <a:gd name="adj1" fmla="val 50717"/>
-              <a:gd name="adj2" fmla="val -5448"/>
-              <a:gd name="adj3" fmla="val 50717"/>
-              <a:gd name="adj4" fmla="val -24141"/>
-              <a:gd name="adj5" fmla="val 14046"/>
-              <a:gd name="adj6" fmla="val -41991"/>
+              <a:gd name="adj1" fmla="val -6153"/>
+              <a:gd name="adj2" fmla="val 12736"/>
+              <a:gd name="adj3" fmla="val -42916"/>
+              <a:gd name="adj4" fmla="val 13001"/>
+              <a:gd name="adj5" fmla="val -58832"/>
+              <a:gd name="adj6" fmla="val 39421"/>
             </a:avLst>
           </a:prstGeom>
           <a:solidFill>
@@ -4108,7 +4237,7 @@
                   <a:schemeClr val="tx1"/>
                 </a:solidFill>
               </a:rPr>
-              <a:t>(2)</a:t>
+              <a:t>(1)</a:t>
             </a:r>
           </a:p>
           <a:p>
@@ -4119,15 +4248,7 @@
                   <a:schemeClr val="tx1"/>
                 </a:solidFill>
               </a:rPr>
-              <a:t>Pagination  </a:t>
-            </a:r>
-            <a:r>
-              <a:rPr lang="en-US" altLang="ja-JP" dirty="0">
-                <a:solidFill>
-                  <a:schemeClr val="tx1"/>
-                </a:solidFill>
-              </a:rPr>
-              <a:t>Information</a:t>
+              <a:t>Fetched data</a:t>
             </a:r>
             <a:endParaRPr kumimoji="1" lang="ja-JP" altLang="en-US" dirty="0">
               <a:solidFill>
@@ -4140,7 +4261,7 @@
     </p:spTree>
     <p:extLst>
       <p:ext uri="{BB962C8B-B14F-4D97-AF65-F5344CB8AC3E}">
-        <p14:creationId xmlns:p14="http://schemas.microsoft.com/office/powerpoint/2010/main" val="2283870519"/>
+        <p14:creationId xmlns:p14="http://schemas.microsoft.com/office/powerpoint/2010/main" val="3519420217"/>
       </p:ext>
     </p:extLst>
   </p:cSld>
@@ -11961,11 +12082,7 @@
             </a:r>
             <a:r>
               <a:rPr lang="en-US" altLang="ja-JP" sz="1300" dirty="0"/>
-              <a:t>(0)"&gt;</a:t>
-            </a:r>
-            <a:r>
-              <a:rPr lang="en-US" altLang="ja-JP" sz="1300" dirty="0"/>
-              <a:t>1&lt;/a&gt;</a:t>
+              <a:t>(0)"&gt;1&lt;/a&gt;</a:t>
             </a:r>
           </a:p>
           <a:p>
@@ -15021,11 +15138,7 @@
             </a:r>
             <a:r>
               <a:rPr lang="en-US" altLang="ja-JP" sz="1300" dirty="0"/>
-              <a:t>(0)"&gt;</a:t>
-            </a:r>
-            <a:r>
-              <a:rPr lang="en-US" altLang="ja-JP" sz="1300" dirty="0"/>
-              <a:t>1&lt;/a&gt;</a:t>
+              <a:t>(0)"&gt;1&lt;/a&gt;</a:t>
             </a:r>
           </a:p>
           <a:p>
@@ -16132,11 +16245,7 @@
             </a:r>
             <a:r>
               <a:rPr lang="en-US" altLang="ja-JP" sz="1300" dirty="0"/>
-              <a:t>"&gt;</a:t>
-            </a:r>
-            <a:r>
-              <a:rPr lang="en-US" altLang="ja-JP" sz="1300" dirty="0"/>
-              <a:t>1&lt;/a&gt;</a:t>
+              <a:t>"&gt;1&lt;/a&gt;</a:t>
             </a:r>
           </a:p>
           <a:p>

</xml_diff>